<commit_message>
Added hidden messeges to activity
</commit_message>
<xml_diff>
--- a/Documents/Presentation.pptx
+++ b/Documents/Presentation.pptx
@@ -268,7 +268,7 @@
           <a:p>
             <a:fld id="{546F50B6-7186-46B7-9A3A-D1973F40F53C}" type="datetimeFigureOut">
               <a:rPr lang="en-US" smtClean="0"/>
-              <a:t>1/18/2020</a:t>
+              <a:t>1/19/20</a:t>
             </a:fld>
             <a:endParaRPr lang="en-US"/>
           </a:p>
@@ -466,7 +466,7 @@
           <a:p>
             <a:fld id="{546F50B6-7186-46B7-9A3A-D1973F40F53C}" type="datetimeFigureOut">
               <a:rPr lang="en-US" smtClean="0"/>
-              <a:t>1/18/2020</a:t>
+              <a:t>1/19/20</a:t>
             </a:fld>
             <a:endParaRPr lang="en-US"/>
           </a:p>
@@ -674,7 +674,7 @@
           <a:p>
             <a:fld id="{546F50B6-7186-46B7-9A3A-D1973F40F53C}" type="datetimeFigureOut">
               <a:rPr lang="en-US" smtClean="0"/>
-              <a:t>1/18/2020</a:t>
+              <a:t>1/19/20</a:t>
             </a:fld>
             <a:endParaRPr lang="en-US"/>
           </a:p>
@@ -872,7 +872,7 @@
           <a:p>
             <a:fld id="{546F50B6-7186-46B7-9A3A-D1973F40F53C}" type="datetimeFigureOut">
               <a:rPr lang="en-US" smtClean="0"/>
-              <a:t>1/18/2020</a:t>
+              <a:t>1/19/20</a:t>
             </a:fld>
             <a:endParaRPr lang="en-US"/>
           </a:p>
@@ -1147,7 +1147,7 @@
           <a:p>
             <a:fld id="{546F50B6-7186-46B7-9A3A-D1973F40F53C}" type="datetimeFigureOut">
               <a:rPr lang="en-US" smtClean="0"/>
-              <a:t>1/18/2020</a:t>
+              <a:t>1/19/20</a:t>
             </a:fld>
             <a:endParaRPr lang="en-US"/>
           </a:p>
@@ -1412,7 +1412,7 @@
           <a:p>
             <a:fld id="{546F50B6-7186-46B7-9A3A-D1973F40F53C}" type="datetimeFigureOut">
               <a:rPr lang="en-US" smtClean="0"/>
-              <a:t>1/18/2020</a:t>
+              <a:t>1/19/20</a:t>
             </a:fld>
             <a:endParaRPr lang="en-US"/>
           </a:p>
@@ -1824,7 +1824,7 @@
           <a:p>
             <a:fld id="{546F50B6-7186-46B7-9A3A-D1973F40F53C}" type="datetimeFigureOut">
               <a:rPr lang="en-US" smtClean="0"/>
-              <a:t>1/18/2020</a:t>
+              <a:t>1/19/20</a:t>
             </a:fld>
             <a:endParaRPr lang="en-US"/>
           </a:p>
@@ -1965,7 +1965,7 @@
           <a:p>
             <a:fld id="{546F50B6-7186-46B7-9A3A-D1973F40F53C}" type="datetimeFigureOut">
               <a:rPr lang="en-US" smtClean="0"/>
-              <a:t>1/18/2020</a:t>
+              <a:t>1/19/20</a:t>
             </a:fld>
             <a:endParaRPr lang="en-US"/>
           </a:p>
@@ -2078,7 +2078,7 @@
           <a:p>
             <a:fld id="{546F50B6-7186-46B7-9A3A-D1973F40F53C}" type="datetimeFigureOut">
               <a:rPr lang="en-US" smtClean="0"/>
-              <a:t>1/18/2020</a:t>
+              <a:t>1/19/20</a:t>
             </a:fld>
             <a:endParaRPr lang="en-US"/>
           </a:p>
@@ -2389,7 +2389,7 @@
           <a:p>
             <a:fld id="{546F50B6-7186-46B7-9A3A-D1973F40F53C}" type="datetimeFigureOut">
               <a:rPr lang="en-US" smtClean="0"/>
-              <a:t>1/18/2020</a:t>
+              <a:t>1/19/20</a:t>
             </a:fld>
             <a:endParaRPr lang="en-US"/>
           </a:p>
@@ -2677,7 +2677,7 @@
           <a:p>
             <a:fld id="{546F50B6-7186-46B7-9A3A-D1973F40F53C}" type="datetimeFigureOut">
               <a:rPr lang="en-US" smtClean="0"/>
-              <a:t>1/18/2020</a:t>
+              <a:t>1/19/20</a:t>
             </a:fld>
             <a:endParaRPr lang="en-US"/>
           </a:p>
@@ -2918,7 +2918,7 @@
           <a:p>
             <a:fld id="{546F50B6-7186-46B7-9A3A-D1973F40F53C}" type="datetimeFigureOut">
               <a:rPr lang="en-US" smtClean="0"/>
-              <a:t>1/18/2020</a:t>
+              <a:t>1/19/20</a:t>
             </a:fld>
             <a:endParaRPr lang="en-US"/>
           </a:p>
@@ -3945,7 +3945,15 @@
           <a:p>
             <a:r>
               <a:rPr lang="en-US" dirty="0"/>
-              <a:t>Steganography Intro Activity</a:t>
+              <a:t>Steganography Intro Act</a:t>
+            </a:r>
+            <a:r>
+              <a:rPr lang="en-US" i="1" dirty="0"/>
+              <a:t>i</a:t>
+            </a:r>
+            <a:r>
+              <a:rPr lang="en-US" dirty="0"/>
+              <a:t>vity</a:t>
             </a:r>
           </a:p>
         </p:txBody>
@@ -3966,12 +3974,231 @@
             <p:ph idx="1"/>
           </p:nvPr>
         </p:nvSpPr>
-        <p:spPr/>
-        <p:txBody>
-          <a:bodyPr/>
-          <a:lstStyle/>
-          <a:p>
-            <a:endParaRPr lang="en-US"/>
+        <p:spPr>
+          <a:xfrm>
+            <a:off x="838200" y="1825625"/>
+            <a:ext cx="10515600" cy="2410044"/>
+          </a:xfrm>
+        </p:spPr>
+        <p:txBody>
+          <a:bodyPr>
+            <a:normAutofit/>
+          </a:bodyPr>
+          <a:lstStyle/>
+          <a:p>
+            <a:r>
+              <a:rPr lang="en-US" dirty="0"/>
+              <a:t>Steganography hides i</a:t>
+            </a:r>
+            <a:r>
+              <a:rPr lang="en-US" i="1" dirty="0"/>
+              <a:t>n</a:t>
+            </a:r>
+            <a:r>
+              <a:rPr lang="en-US" dirty="0"/>
+              <a:t>formation using a variety of metho</a:t>
+            </a:r>
+            <a:r>
+              <a:rPr lang="en-US" b="1" dirty="0"/>
+              <a:t>d</a:t>
+            </a:r>
+            <a:r>
+              <a:rPr lang="en-US" dirty="0"/>
+              <a:t>s. </a:t>
+            </a:r>
+            <a:r>
+              <a:rPr lang="en-US" dirty="0" err="1"/>
+              <a:t>UnlikE</a:t>
+            </a:r>
+            <a:r>
+              <a:rPr lang="en-US" dirty="0"/>
+              <a:t> </a:t>
+            </a:r>
+            <a:r>
+              <a:rPr lang="en-US" b="1" dirty="0"/>
+              <a:t>e</a:t>
+            </a:r>
+            <a:r>
+              <a:rPr lang="en-US" dirty="0"/>
+              <a:t>ncryption, who’s only </a:t>
+            </a:r>
+            <a:r>
+              <a:rPr lang="en-US" dirty="0" err="1"/>
+              <a:t>goAl</a:t>
+            </a:r>
+            <a:r>
+              <a:rPr lang="en-US" dirty="0"/>
+              <a:t> is to obscure da</a:t>
+            </a:r>
+            <a:r>
+              <a:rPr lang="en-US" b="1" dirty="0"/>
+              <a:t>t</a:t>
+            </a:r>
+            <a:r>
+              <a:rPr lang="en-US" dirty="0"/>
+              <a:t>a, hidden data is able to carry larg</a:t>
+            </a:r>
+            <a:r>
+              <a:rPr lang="en-US" b="1" dirty="0"/>
+              <a:t>e</a:t>
+            </a:r>
+            <a:r>
+              <a:rPr lang="en-US" dirty="0"/>
+              <a:t> </a:t>
+            </a:r>
+            <a:r>
+              <a:rPr lang="en-US" dirty="0" err="1"/>
+              <a:t>amountS</a:t>
+            </a:r>
+            <a:r>
+              <a:rPr lang="en-US" dirty="0"/>
+              <a:t> of in</a:t>
+            </a:r>
+            <a:r>
+              <a:rPr lang="en-US" i="1" dirty="0"/>
+              <a:t>f</a:t>
+            </a:r>
+            <a:r>
+              <a:rPr lang="en-US" dirty="0"/>
+              <a:t>ormation with</a:t>
+            </a:r>
+            <a:r>
+              <a:rPr lang="en-US" i="1" dirty="0"/>
+              <a:t>o</a:t>
+            </a:r>
+            <a:r>
+              <a:rPr lang="en-US" dirty="0"/>
+              <a:t>ut dete</a:t>
+            </a:r>
+            <a:r>
+              <a:rPr lang="en-US" b="1" dirty="0"/>
+              <a:t>c</a:t>
+            </a:r>
+            <a:r>
+              <a:rPr lang="en-US" dirty="0"/>
+              <a:t>tion. Methods fo</a:t>
+            </a:r>
+            <a:r>
+              <a:rPr lang="en-US" i="1" dirty="0"/>
+              <a:t>r</a:t>
+            </a:r>
+            <a:r>
+              <a:rPr lang="en-US" dirty="0"/>
+              <a:t> redirecting one’s at</a:t>
+            </a:r>
+            <a:r>
+              <a:rPr lang="en-US" b="1" dirty="0"/>
+              <a:t>t</a:t>
+            </a:r>
+            <a:r>
+              <a:rPr lang="en-US" dirty="0"/>
+              <a:t>ention can be used to further hide infor</a:t>
+            </a:r>
+            <a:r>
+              <a:rPr lang="en-US" i="1" dirty="0"/>
+              <a:t>m</a:t>
+            </a:r>
+            <a:r>
+              <a:rPr lang="en-US" dirty="0"/>
+              <a:t>ation. </a:t>
+            </a:r>
+            <a:r>
+              <a:rPr lang="en-US" dirty="0" err="1"/>
+              <a:t>E</a:t>
+            </a:r>
+            <a:r>
+              <a:rPr lang="en-US" i="1" dirty="0" err="1"/>
+              <a:t>a</a:t>
+            </a:r>
+            <a:r>
+              <a:rPr lang="en-US" dirty="0" err="1"/>
+              <a:t>rlY</a:t>
+            </a:r>
+            <a:r>
+              <a:rPr lang="en-US" dirty="0"/>
+              <a:t> uses include changing </a:t>
+            </a:r>
+            <a:r>
+              <a:rPr lang="en-US" i="1" dirty="0"/>
+              <a:t>t</a:t>
+            </a:r>
+            <a:r>
+              <a:rPr lang="en-US" dirty="0"/>
+              <a:t>ypefaces and fonts </a:t>
+            </a:r>
+            <a:r>
+              <a:rPr lang="en-US" i="1" dirty="0"/>
+              <a:t>i</a:t>
+            </a:r>
+            <a:r>
+              <a:rPr lang="en-US" dirty="0"/>
+              <a:t>n a bl</a:t>
+            </a:r>
+            <a:r>
+              <a:rPr lang="en-US" i="1" dirty="0"/>
+              <a:t>o</a:t>
+            </a:r>
+            <a:r>
+              <a:rPr lang="en-US" dirty="0"/>
+              <a:t>ck of text a</a:t>
+            </a:r>
+            <a:r>
+              <a:rPr lang="en-US" i="1" dirty="0"/>
+              <a:t>n</a:t>
+            </a:r>
+            <a:r>
+              <a:rPr lang="en-US" dirty="0"/>
+              <a:t>d tattooing a message onto the head of a slave. </a:t>
+            </a:r>
+          </a:p>
+          <a:p>
+            <a:endParaRPr lang="en-US" dirty="0"/>
+          </a:p>
+          <a:p>
+            <a:endParaRPr lang="en-US" dirty="0"/>
+          </a:p>
+        </p:txBody>
+      </p:sp>
+      <p:sp>
+        <p:nvSpPr>
+          <p:cNvPr id="4" name="TextBox 3">
+            <a:extLst>
+              <a:ext uri="{FF2B5EF4-FFF2-40B4-BE49-F238E27FC236}">
+                <a16:creationId xmlns:a16="http://schemas.microsoft.com/office/drawing/2014/main" id="{AE447091-7660-CA4E-9059-01EB6CB25840}"/>
+              </a:ext>
+            </a:extLst>
+          </p:cNvPr>
+          <p:cNvSpPr txBox="1"/>
+          <p:nvPr/>
+        </p:nvSpPr>
+        <p:spPr>
+          <a:xfrm>
+            <a:off x="838200" y="4372303"/>
+            <a:ext cx="10515600" cy="523220"/>
+          </a:xfrm>
+          <a:prstGeom prst="rect">
+            <a:avLst/>
+          </a:prstGeom>
+          <a:noFill/>
+        </p:spPr>
+        <p:txBody>
+          <a:bodyPr wrap="square" rtlCol="0">
+            <a:spAutoFit/>
+          </a:bodyPr>
+          <a:lstStyle/>
+          <a:p>
+            <a:pPr marL="285750" indent="-285750">
+              <a:buFont typeface="Arial" panose="020B0604020202020204" pitchFamily="34" charset="0"/>
+              <a:buChar char="•"/>
+            </a:pPr>
+            <a:r>
+              <a:rPr lang="en-US" sz="2800" dirty="0">
+                <a:solidFill>
+                  <a:schemeClr val="bg1"/>
+                </a:solidFill>
+              </a:rPr>
+              <a:t>Some messages are harder to find than others…</a:t>
+            </a:r>
           </a:p>
         </p:txBody>
       </p:sp>

</xml_diff>

<commit_message>
added slide for digital image steganography
</commit_message>
<xml_diff>
--- a/Documents/Presentation.pptx
+++ b/Documents/Presentation.pptx
@@ -10,13 +10,14 @@
     <p:sldId id="257" r:id="rId4"/>
     <p:sldId id="264" r:id="rId5"/>
     <p:sldId id="266" r:id="rId6"/>
-    <p:sldId id="258" r:id="rId7"/>
+    <p:sldId id="269" r:id="rId7"/>
     <p:sldId id="265" r:id="rId8"/>
-    <p:sldId id="267" r:id="rId9"/>
-    <p:sldId id="268" r:id="rId10"/>
-    <p:sldId id="259" r:id="rId11"/>
-    <p:sldId id="260" r:id="rId12"/>
-    <p:sldId id="262" r:id="rId13"/>
+    <p:sldId id="258" r:id="rId9"/>
+    <p:sldId id="267" r:id="rId10"/>
+    <p:sldId id="268" r:id="rId11"/>
+    <p:sldId id="259" r:id="rId12"/>
+    <p:sldId id="260" r:id="rId13"/>
+    <p:sldId id="262" r:id="rId14"/>
   </p:sldIdLst>
   <p:sldSz cx="12192000" cy="6858000"/>
   <p:notesSz cx="6858000" cy="9144000"/>
@@ -3361,14 +3362,14 @@
           <a:lstStyle/>
           <a:p>
             <a:r>
-              <a:rPr lang="en-US" dirty="0"/>
+              <a:rPr lang="en-US" sz="8000" dirty="0"/>
               <a:t>Steganography</a:t>
             </a:r>
             <a:br>
               <a:rPr lang="en-US" dirty="0"/>
             </a:br>
             <a:r>
-              <a:rPr lang="en-US" sz="2800" dirty="0"/>
+              <a:rPr lang="en-US" sz="3600" dirty="0"/>
               <a:t>Hiding information in plain sight</a:t>
             </a:r>
             <a:endParaRPr lang="en-US" dirty="0"/>
@@ -3451,7 +3452,7 @@
           <p:cNvPr id="2" name="Title 1">
             <a:extLst>
               <a:ext uri="{FF2B5EF4-FFF2-40B4-BE49-F238E27FC236}">
-                <a16:creationId xmlns:a16="http://schemas.microsoft.com/office/drawing/2014/main" id="{188C3C5B-0284-4A9F-95C1-2DB7BD15C05D}"/>
+                <a16:creationId xmlns:a16="http://schemas.microsoft.com/office/drawing/2014/main" id="{257DA0E4-92F2-46FF-8796-091B2FDE9AD1}"/>
               </a:ext>
             </a:extLst>
           </p:cNvPr>
@@ -3469,22 +3470,7 @@
           <a:p>
             <a:r>
               <a:rPr lang="en-US" dirty="0"/>
-              <a:t>The </a:t>
-            </a:r>
-            <a:r>
-              <a:rPr lang="en-US" b="1" dirty="0">
-                <a:latin typeface="GreekC" panose="00000400000000000000" pitchFamily="2" charset="0"/>
-                <a:cs typeface="GreekC" panose="00000400000000000000" pitchFamily="2" charset="0"/>
-              </a:rPr>
-              <a:t>c</a:t>
-            </a:r>
-            <a:r>
-              <a:rPr lang="en-US" baseline="30000" dirty="0"/>
-              <a:t>2</a:t>
-            </a:r>
-            <a:r>
-              <a:rPr lang="en-US" dirty="0"/>
-              <a:t> attack</a:t>
+              <a:t>Discrete cosine transform</a:t>
             </a:r>
           </a:p>
         </p:txBody>
@@ -3494,7 +3480,7 @@
           <p:cNvPr id="3" name="Content Placeholder 2">
             <a:extLst>
               <a:ext uri="{FF2B5EF4-FFF2-40B4-BE49-F238E27FC236}">
-                <a16:creationId xmlns:a16="http://schemas.microsoft.com/office/drawing/2014/main" id="{AC4D4EF4-3E7F-4133-B3D7-374DD688A391}"/>
+                <a16:creationId xmlns:a16="http://schemas.microsoft.com/office/drawing/2014/main" id="{DA0CFE40-8C04-4769-8246-4757CCD53D35}"/>
               </a:ext>
             </a:extLst>
           </p:cNvPr>
@@ -3512,15 +3498,111 @@
           <a:p>
             <a:r>
               <a:rPr lang="en-US" dirty="0"/>
-              <a:t>Histogram of DCT coefficients</a:t>
-            </a:r>
-          </a:p>
-        </p:txBody>
-      </p:sp>
+              <a:t>Represents 8x8 block of pixels as</a:t>
+            </a:r>
+          </a:p>
+          <a:p>
+            <a:pPr marL="0" indent="0">
+              <a:buNone/>
+            </a:pPr>
+            <a:r>
+              <a:rPr lang="en-US" dirty="0"/>
+              <a:t>   weights of this chart</a:t>
+            </a:r>
+          </a:p>
+          <a:p>
+            <a:r>
+              <a:rPr lang="en-US" dirty="0"/>
+              <a:t>For example, a black “A” on white</a:t>
+            </a:r>
+          </a:p>
+          <a:p>
+            <a:pPr marL="0" indent="0">
+              <a:buNone/>
+            </a:pPr>
+            <a:r>
+              <a:rPr lang="en-US" dirty="0"/>
+              <a:t>   background</a:t>
+            </a:r>
+          </a:p>
+        </p:txBody>
+      </p:sp>
+      <p:pic>
+        <p:nvPicPr>
+          <p:cNvPr id="9" name="Picture 8" descr="A screen shot of a window&#10;&#10;Description automatically generated">
+            <a:extLst>
+              <a:ext uri="{FF2B5EF4-FFF2-40B4-BE49-F238E27FC236}">
+                <a16:creationId xmlns:a16="http://schemas.microsoft.com/office/drawing/2014/main" id="{5C0CA914-DFDD-40D0-B9ED-C5457201D0C7}"/>
+              </a:ext>
+            </a:extLst>
+          </p:cNvPr>
+          <p:cNvPicPr>
+            <a:picLocks noChangeAspect="1"/>
+          </p:cNvPicPr>
+          <p:nvPr/>
+        </p:nvPicPr>
+        <p:blipFill>
+          <a:blip r:embed="rId2">
+            <a:extLst>
+              <a:ext uri="{28A0092B-C50C-407E-A947-70E740481C1C}">
+                <a14:useLocalDpi xmlns:a14="http://schemas.microsoft.com/office/drawing/2010/main" val="0"/>
+              </a:ext>
+            </a:extLst>
+          </a:blip>
+          <a:stretch>
+            <a:fillRect/>
+          </a:stretch>
+        </p:blipFill>
+        <p:spPr>
+          <a:xfrm>
+            <a:off x="7109928" y="1775702"/>
+            <a:ext cx="4861120" cy="4861120"/>
+          </a:xfrm>
+          <a:prstGeom prst="rect">
+            <a:avLst/>
+          </a:prstGeom>
+        </p:spPr>
+      </p:pic>
+      <p:pic>
+        <p:nvPicPr>
+          <p:cNvPr id="13" name="Picture 12" descr="A close up of a logo&#10;&#10;Description automatically generated">
+            <a:extLst>
+              <a:ext uri="{FF2B5EF4-FFF2-40B4-BE49-F238E27FC236}">
+                <a16:creationId xmlns:a16="http://schemas.microsoft.com/office/drawing/2014/main" id="{17E61B60-7155-4D37-8377-BAC559FE8D61}"/>
+              </a:ext>
+            </a:extLst>
+          </p:cNvPr>
+          <p:cNvPicPr>
+            <a:picLocks noChangeAspect="1"/>
+          </p:cNvPicPr>
+          <p:nvPr/>
+        </p:nvPicPr>
+        <p:blipFill>
+          <a:blip r:embed="rId3">
+            <a:extLst>
+              <a:ext uri="{28A0092B-C50C-407E-A947-70E740481C1C}">
+                <a14:useLocalDpi xmlns:a14="http://schemas.microsoft.com/office/drawing/2010/main" val="0"/>
+              </a:ext>
+            </a:extLst>
+          </a:blip>
+          <a:stretch>
+            <a:fillRect/>
+          </a:stretch>
+        </p:blipFill>
+        <p:spPr>
+          <a:xfrm>
+            <a:off x="1234881" y="4859055"/>
+            <a:ext cx="4861119" cy="1633820"/>
+          </a:xfrm>
+          <a:prstGeom prst="rect">
+            <a:avLst/>
+          </a:prstGeom>
+        </p:spPr>
+      </p:pic>
     </p:spTree>
     <p:extLst>
       <p:ext uri="{BB962C8B-B14F-4D97-AF65-F5344CB8AC3E}">
-        <p14:creationId xmlns:p14="http://schemas.microsoft.com/office/powerpoint/2010/main" val="1264975641"/>
+        <p14:creationId xmlns:p14="http://schemas.microsoft.com/office/powerpoint/2010/main" val="3713360684"/>
       </p:ext>
     </p:extLst>
   </p:cSld>
@@ -3552,6 +3634,107 @@
           <p:cNvPr id="2" name="Title 1">
             <a:extLst>
               <a:ext uri="{FF2B5EF4-FFF2-40B4-BE49-F238E27FC236}">
+                <a16:creationId xmlns:a16="http://schemas.microsoft.com/office/drawing/2014/main" id="{188C3C5B-0284-4A9F-95C1-2DB7BD15C05D}"/>
+              </a:ext>
+            </a:extLst>
+          </p:cNvPr>
+          <p:cNvSpPr>
+            <a:spLocks noGrp="1"/>
+          </p:cNvSpPr>
+          <p:nvPr>
+            <p:ph type="title"/>
+          </p:nvPr>
+        </p:nvSpPr>
+        <p:spPr/>
+        <p:txBody>
+          <a:bodyPr/>
+          <a:lstStyle/>
+          <a:p>
+            <a:r>
+              <a:rPr lang="en-US" dirty="0"/>
+              <a:t>The </a:t>
+            </a:r>
+            <a:r>
+              <a:rPr lang="en-US" b="1" dirty="0">
+                <a:latin typeface="GreekC" panose="00000400000000000000" pitchFamily="2" charset="0"/>
+                <a:cs typeface="GreekC" panose="00000400000000000000" pitchFamily="2" charset="0"/>
+              </a:rPr>
+              <a:t>c</a:t>
+            </a:r>
+            <a:r>
+              <a:rPr lang="en-US" baseline="30000" dirty="0"/>
+              <a:t>2</a:t>
+            </a:r>
+            <a:r>
+              <a:rPr lang="en-US" dirty="0"/>
+              <a:t> attack</a:t>
+            </a:r>
+          </a:p>
+        </p:txBody>
+      </p:sp>
+      <p:sp>
+        <p:nvSpPr>
+          <p:cNvPr id="3" name="Content Placeholder 2">
+            <a:extLst>
+              <a:ext uri="{FF2B5EF4-FFF2-40B4-BE49-F238E27FC236}">
+                <a16:creationId xmlns:a16="http://schemas.microsoft.com/office/drawing/2014/main" id="{AC4D4EF4-3E7F-4133-B3D7-374DD688A391}"/>
+              </a:ext>
+            </a:extLst>
+          </p:cNvPr>
+          <p:cNvSpPr>
+            <a:spLocks noGrp="1"/>
+          </p:cNvSpPr>
+          <p:nvPr>
+            <p:ph idx="1"/>
+          </p:nvPr>
+        </p:nvSpPr>
+        <p:spPr/>
+        <p:txBody>
+          <a:bodyPr/>
+          <a:lstStyle/>
+          <a:p>
+            <a:r>
+              <a:rPr lang="en-US" dirty="0"/>
+              <a:t>Histogram of DCT coefficients</a:t>
+            </a:r>
+          </a:p>
+        </p:txBody>
+      </p:sp>
+    </p:spTree>
+    <p:extLst>
+      <p:ext uri="{BB962C8B-B14F-4D97-AF65-F5344CB8AC3E}">
+        <p14:creationId xmlns:p14="http://schemas.microsoft.com/office/powerpoint/2010/main" val="1264975641"/>
+      </p:ext>
+    </p:extLst>
+  </p:cSld>
+  <p:clrMapOvr>
+    <a:masterClrMapping/>
+  </p:clrMapOvr>
+</p:sld>
+</file>
+
+<file path=ppt/slides/slide12.xml><?xml version="1.0" encoding="utf-8"?>
+<p:sld xmlns:a="http://schemas.openxmlformats.org/drawingml/2006/main" xmlns:r="http://schemas.openxmlformats.org/officeDocument/2006/relationships" xmlns:p="http://schemas.openxmlformats.org/presentationml/2006/main">
+  <p:cSld>
+    <p:spTree>
+      <p:nvGrpSpPr>
+        <p:cNvPr id="1" name=""/>
+        <p:cNvGrpSpPr/>
+        <p:nvPr/>
+      </p:nvGrpSpPr>
+      <p:grpSpPr>
+        <a:xfrm>
+          <a:off x="0" y="0"/>
+          <a:ext cx="0" cy="0"/>
+          <a:chOff x="0" y="0"/>
+          <a:chExt cx="0" cy="0"/>
+        </a:xfrm>
+      </p:grpSpPr>
+      <p:sp>
+        <p:nvSpPr>
+          <p:cNvPr id="2" name="Title 1">
+            <a:extLst>
+              <a:ext uri="{FF2B5EF4-FFF2-40B4-BE49-F238E27FC236}">
                 <a16:creationId xmlns:a16="http://schemas.microsoft.com/office/drawing/2014/main" id="{063C45F0-89D2-4657-882E-DA7CD6F40220}"/>
               </a:ext>
             </a:extLst>
@@ -3613,7 +3796,7 @@
 </p:sld>
 </file>
 
-<file path=ppt/slides/slide12.xml><?xml version="1.0" encoding="utf-8"?>
+<file path=ppt/slides/slide13.xml><?xml version="1.0" encoding="utf-8"?>
 <p:sld xmlns:a="http://schemas.openxmlformats.org/drawingml/2006/main" xmlns:r="http://schemas.openxmlformats.org/officeDocument/2006/relationships" xmlns:p="http://schemas.openxmlformats.org/presentationml/2006/main">
   <p:cSld>
     <p:spTree>
@@ -4133,64 +4316,71 @@
             <p:ph type="title"/>
           </p:nvPr>
         </p:nvSpPr>
-        <p:spPr/>
-        <p:txBody>
-          <a:bodyPr/>
-          <a:lstStyle/>
-          <a:p>
-            <a:r>
-              <a:rPr lang="en-US" dirty="0"/>
-              <a:t>Historical context</a:t>
-            </a:r>
-          </a:p>
-        </p:txBody>
-      </p:sp>
-      <p:sp>
-        <p:nvSpPr>
-          <p:cNvPr id="3" name="Content Placeholder 2">
-            <a:extLst>
-              <a:ext uri="{FF2B5EF4-FFF2-40B4-BE49-F238E27FC236}">
-                <a16:creationId xmlns:a16="http://schemas.microsoft.com/office/drawing/2014/main" id="{0E319BFA-01DD-44ED-A179-A80BB89DEF6D}"/>
-              </a:ext>
-            </a:extLst>
-          </p:cNvPr>
-          <p:cNvSpPr>
-            <a:spLocks noGrp="1"/>
-          </p:cNvSpPr>
-          <p:nvPr>
-            <p:ph idx="1"/>
-          </p:nvPr>
-        </p:nvSpPr>
         <p:spPr>
           <a:xfrm>
-            <a:off x="408992" y="1825624"/>
-            <a:ext cx="10515600" cy="4351338"/>
+            <a:off x="408992" y="365125"/>
+            <a:ext cx="10944808" cy="1325563"/>
           </a:xfrm>
         </p:spPr>
         <p:txBody>
-          <a:bodyPr/>
-          <a:lstStyle/>
-          <a:p>
-            <a:r>
-              <a:rPr lang="en-US" sz="2400" dirty="0"/>
+          <a:bodyPr>
+            <a:normAutofit/>
+          </a:bodyPr>
+          <a:lstStyle/>
+          <a:p>
+            <a:r>
+              <a:rPr lang="en-US" sz="5400" dirty="0"/>
+              <a:t>Historical context</a:t>
+            </a:r>
+          </a:p>
+        </p:txBody>
+      </p:sp>
+      <p:sp>
+        <p:nvSpPr>
+          <p:cNvPr id="3" name="Content Placeholder 2">
+            <a:extLst>
+              <a:ext uri="{FF2B5EF4-FFF2-40B4-BE49-F238E27FC236}">
+                <a16:creationId xmlns:a16="http://schemas.microsoft.com/office/drawing/2014/main" id="{0E319BFA-01DD-44ED-A179-A80BB89DEF6D}"/>
+              </a:ext>
+            </a:extLst>
+          </p:cNvPr>
+          <p:cNvSpPr>
+            <a:spLocks noGrp="1"/>
+          </p:cNvSpPr>
+          <p:nvPr>
+            <p:ph idx="1"/>
+          </p:nvPr>
+        </p:nvSpPr>
+        <p:spPr>
+          <a:xfrm>
+            <a:off x="408992" y="1514475"/>
+            <a:ext cx="10515600" cy="4662487"/>
+          </a:xfrm>
+        </p:spPr>
+        <p:txBody>
+          <a:bodyPr/>
+          <a:lstStyle/>
+          <a:p>
+            <a:r>
+              <a:rPr lang="en-US" dirty="0"/>
               <a:t>440 BC – Greeks tattooed onto shaved head</a:t>
             </a:r>
           </a:p>
           <a:p>
             <a:r>
-              <a:rPr lang="en-US" sz="2400" dirty="0"/>
+              <a:rPr lang="en-US" dirty="0"/>
               <a:t>480 BC – Spartans wax tablets</a:t>
             </a:r>
           </a:p>
           <a:p>
             <a:r>
-              <a:rPr lang="en-US" sz="2400" dirty="0"/>
+              <a:rPr lang="en-US" dirty="0"/>
               <a:t>1776 – Revolutionary war invisible ink  </a:t>
             </a:r>
           </a:p>
           <a:p>
             <a:r>
-              <a:rPr lang="en-US" sz="2400" dirty="0"/>
+              <a:rPr lang="en-US" dirty="0"/>
               <a:t>1940s – WWII Microdots </a:t>
             </a:r>
           </a:p>
@@ -4261,8 +4451,8 @@
         </p:blipFill>
         <p:spPr>
           <a:xfrm>
-            <a:off x="7494040" y="3490843"/>
-            <a:ext cx="4505130" cy="3107757"/>
+            <a:off x="7352522" y="3443430"/>
+            <a:ext cx="4721292" cy="3256871"/>
           </a:xfrm>
           <a:prstGeom prst="rect">
             <a:avLst/>
@@ -4297,12 +4487,57 @@
         </p:blipFill>
         <p:spPr>
           <a:xfrm>
-            <a:off x="3886017" y="3769567"/>
+            <a:off x="991183" y="3845718"/>
             <a:ext cx="3561550" cy="2829033"/>
           </a:xfrm>
           <a:prstGeom prst="rect">
             <a:avLst/>
           </a:prstGeom>
+        </p:spPr>
+      </p:pic>
+      <p:pic>
+        <p:nvPicPr>
+          <p:cNvPr id="2050" name="Picture 2" descr="Image result for invisible ink candle">
+            <a:extLst>
+              <a:ext uri="{FF2B5EF4-FFF2-40B4-BE49-F238E27FC236}">
+                <a16:creationId xmlns:a16="http://schemas.microsoft.com/office/drawing/2014/main" id="{F8D32513-25CE-482D-8424-B52C80A5D295}"/>
+              </a:ext>
+            </a:extLst>
+          </p:cNvPr>
+          <p:cNvPicPr>
+            <a:picLocks noChangeAspect="1" noChangeArrowheads="1"/>
+          </p:cNvPicPr>
+          <p:nvPr/>
+        </p:nvPicPr>
+        <p:blipFill rotWithShape="1">
+          <a:blip r:embed="rId5">
+            <a:extLst>
+              <a:ext uri="{28A0092B-C50C-407E-A947-70E740481C1C}">
+                <a14:useLocalDpi xmlns:a14="http://schemas.microsoft.com/office/drawing/2010/main" val="0"/>
+              </a:ext>
+            </a:extLst>
+          </a:blip>
+          <a:srcRect l="27344" t="4420" r="31511" b="27816"/>
+          <a:stretch/>
+        </p:blipFill>
+        <p:spPr bwMode="auto">
+          <a:xfrm>
+            <a:off x="4428907" y="3443430"/>
+            <a:ext cx="2619009" cy="3240609"/>
+          </a:xfrm>
+          <a:prstGeom prst="rect">
+            <a:avLst/>
+          </a:prstGeom>
+          <a:noFill/>
+          <a:extLst>
+            <a:ext uri="{909E8E84-426E-40DD-AFC4-6F175D3DCCD1}">
+              <a14:hiddenFill xmlns:a14="http://schemas.microsoft.com/office/drawing/2010/main">
+                <a:solidFill>
+                  <a:srgbClr val="FFFFFF"/>
+                </a:solidFill>
+              </a14:hiddenFill>
+            </a:ext>
+          </a:extLst>
         </p:spPr>
       </p:pic>
     </p:spTree>
@@ -4861,7 +5096,7 @@
           <p:cNvPr id="2" name="Title 1">
             <a:extLst>
               <a:ext uri="{FF2B5EF4-FFF2-40B4-BE49-F238E27FC236}">
-                <a16:creationId xmlns:a16="http://schemas.microsoft.com/office/drawing/2014/main" id="{5BB14DAE-F668-4B03-80C5-1509C374856B}"/>
+                <a16:creationId xmlns:a16="http://schemas.microsoft.com/office/drawing/2014/main" id="{A50C8616-32EF-45C2-B8C7-AEA2E25A942A}"/>
               </a:ext>
             </a:extLst>
           </p:cNvPr>
@@ -4879,7 +5114,7 @@
           <a:p>
             <a:r>
               <a:rPr lang="en-US" dirty="0"/>
-              <a:t>Terms/notation</a:t>
+              <a:t>Digital Image Steganography</a:t>
             </a:r>
           </a:p>
         </p:txBody>
@@ -4889,7 +5124,7 @@
           <p:cNvPr id="3" name="Content Placeholder 2">
             <a:extLst>
               <a:ext uri="{FF2B5EF4-FFF2-40B4-BE49-F238E27FC236}">
-                <a16:creationId xmlns:a16="http://schemas.microsoft.com/office/drawing/2014/main" id="{229D3A98-7654-4CCC-90C7-6B8984A8162D}"/>
+                <a16:creationId xmlns:a16="http://schemas.microsoft.com/office/drawing/2014/main" id="{191374EF-F4FF-4DB6-A8C6-2AD79CB466CC}"/>
               </a:ext>
             </a:extLst>
           </p:cNvPr>
@@ -4906,41 +5141,33 @@
           <a:lstStyle/>
           <a:p>
             <a:r>
-              <a:rPr lang="en-US" dirty="0" err="1"/>
-              <a:t>Steganograms</a:t>
-            </a:r>
-            <a:r>
-              <a:rPr lang="en-US" dirty="0"/>
-              <a:t> – steganographic messages </a:t>
-            </a:r>
-          </a:p>
-          <a:p>
-            <a:r>
-              <a:rPr lang="en-US" dirty="0" err="1"/>
-              <a:t>Steganalysis</a:t>
-            </a:r>
-            <a:r>
-              <a:rPr lang="en-US" dirty="0"/>
-              <a:t> – searching for </a:t>
-            </a:r>
-            <a:r>
-              <a:rPr lang="en-US" dirty="0" err="1"/>
-              <a:t>steganograms</a:t>
+              <a:rPr lang="en-US" dirty="0"/>
+              <a:t>Information can be stored inside media files</a:t>
+            </a:r>
+          </a:p>
+          <a:p>
+            <a:r>
+              <a:rPr lang="en-US" dirty="0"/>
+              <a:t>Making small changes that will be indiscernible from the original</a:t>
+            </a:r>
+          </a:p>
+          <a:p>
+            <a:r>
+              <a:rPr lang="en-US" dirty="0"/>
+              <a:t>Common approach is to </a:t>
+            </a:r>
+            <a:r>
+              <a:rPr lang="en-US"/>
+              <a:t>use LSB </a:t>
             </a:r>
             <a:endParaRPr lang="en-US" dirty="0"/>
-          </a:p>
-          <a:p>
-            <a:r>
-              <a:rPr lang="en-US" dirty="0"/>
-              <a:t>Lossy and lossless</a:t>
-            </a:r>
           </a:p>
         </p:txBody>
       </p:sp>
     </p:spTree>
     <p:extLst>
       <p:ext uri="{BB962C8B-B14F-4D97-AF65-F5344CB8AC3E}">
-        <p14:creationId xmlns:p14="http://schemas.microsoft.com/office/powerpoint/2010/main" val="611404031"/>
+        <p14:creationId xmlns:p14="http://schemas.microsoft.com/office/powerpoint/2010/main" val="3925167741"/>
       </p:ext>
     </p:extLst>
   </p:cSld>
@@ -5011,7 +5238,12 @@
             <p:ph idx="1"/>
           </p:nvPr>
         </p:nvSpPr>
-        <p:spPr/>
+        <p:spPr>
+          <a:xfrm>
+            <a:off x="838200" y="1524000"/>
+            <a:ext cx="10515600" cy="4652963"/>
+          </a:xfrm>
+        </p:spPr>
         <p:txBody>
           <a:bodyPr/>
           <a:lstStyle/>
@@ -5067,7 +5299,7 @@
           <p:cNvPr id="2" name="Title 1">
             <a:extLst>
               <a:ext uri="{FF2B5EF4-FFF2-40B4-BE49-F238E27FC236}">
-                <a16:creationId xmlns:a16="http://schemas.microsoft.com/office/drawing/2014/main" id="{51189FC1-5D10-4818-98A8-A3E02C456A8D}"/>
+                <a16:creationId xmlns:a16="http://schemas.microsoft.com/office/drawing/2014/main" id="{5BB14DAE-F668-4B03-80C5-1509C374856B}"/>
               </a:ext>
             </a:extLst>
           </p:cNvPr>
@@ -5085,7 +5317,7 @@
           <a:p>
             <a:r>
               <a:rPr lang="en-US" dirty="0"/>
-              <a:t>Lossless Bitmap</a:t>
+              <a:t>Terms/notation</a:t>
             </a:r>
           </a:p>
         </p:txBody>
@@ -5095,7 +5327,7 @@
           <p:cNvPr id="3" name="Content Placeholder 2">
             <a:extLst>
               <a:ext uri="{FF2B5EF4-FFF2-40B4-BE49-F238E27FC236}">
-                <a16:creationId xmlns:a16="http://schemas.microsoft.com/office/drawing/2014/main" id="{8F0B26D8-9DE9-4D2A-8B4E-FD709BFB6B75}"/>
+                <a16:creationId xmlns:a16="http://schemas.microsoft.com/office/drawing/2014/main" id="{229D3A98-7654-4CCC-90C7-6B8984A8162D}"/>
               </a:ext>
             </a:extLst>
           </p:cNvPr>
@@ -5112,8 +5344,33 @@
           <a:lstStyle/>
           <a:p>
             <a:r>
-              <a:rPr lang="en-US" dirty="0"/>
-              <a:t>Each pixel has a color value stored for r, g, b</a:t>
+              <a:rPr lang="en-US" dirty="0" err="1"/>
+              <a:t>Steganograms</a:t>
+            </a:r>
+            <a:r>
+              <a:rPr lang="en-US" dirty="0"/>
+              <a:t> – steganographic messages </a:t>
+            </a:r>
+          </a:p>
+          <a:p>
+            <a:r>
+              <a:rPr lang="en-US" dirty="0" err="1"/>
+              <a:t>Steganalysis</a:t>
+            </a:r>
+            <a:r>
+              <a:rPr lang="en-US" dirty="0"/>
+              <a:t> – searching for </a:t>
+            </a:r>
+            <a:r>
+              <a:rPr lang="en-US" dirty="0" err="1"/>
+              <a:t>steganograms</a:t>
+            </a:r>
+            <a:endParaRPr lang="en-US" dirty="0"/>
+          </a:p>
+          <a:p>
+            <a:r>
+              <a:rPr lang="en-US" dirty="0"/>
+              <a:t>Lossy and lossless</a:t>
             </a:r>
           </a:p>
         </p:txBody>
@@ -5121,7 +5378,7 @@
     </p:spTree>
     <p:extLst>
       <p:ext uri="{BB962C8B-B14F-4D97-AF65-F5344CB8AC3E}">
-        <p14:creationId xmlns:p14="http://schemas.microsoft.com/office/powerpoint/2010/main" val="2939054782"/>
+        <p14:creationId xmlns:p14="http://schemas.microsoft.com/office/powerpoint/2010/main" val="611404031"/>
       </p:ext>
     </p:extLst>
   </p:cSld>
@@ -5153,7 +5410,7 @@
           <p:cNvPr id="2" name="Title 1">
             <a:extLst>
               <a:ext uri="{FF2B5EF4-FFF2-40B4-BE49-F238E27FC236}">
-                <a16:creationId xmlns:a16="http://schemas.microsoft.com/office/drawing/2014/main" id="{257DA0E4-92F2-46FF-8796-091B2FDE9AD1}"/>
+                <a16:creationId xmlns:a16="http://schemas.microsoft.com/office/drawing/2014/main" id="{51189FC1-5D10-4818-98A8-A3E02C456A8D}"/>
               </a:ext>
             </a:extLst>
           </p:cNvPr>
@@ -5171,7 +5428,7 @@
           <a:p>
             <a:r>
               <a:rPr lang="en-US" dirty="0"/>
-              <a:t>Discrete cosine transform</a:t>
+              <a:t>Lossless Bitmap</a:t>
             </a:r>
           </a:p>
         </p:txBody>
@@ -5181,7 +5438,7 @@
           <p:cNvPr id="3" name="Content Placeholder 2">
             <a:extLst>
               <a:ext uri="{FF2B5EF4-FFF2-40B4-BE49-F238E27FC236}">
-                <a16:creationId xmlns:a16="http://schemas.microsoft.com/office/drawing/2014/main" id="{DA0CFE40-8C04-4769-8246-4757CCD53D35}"/>
+                <a16:creationId xmlns:a16="http://schemas.microsoft.com/office/drawing/2014/main" id="{8F0B26D8-9DE9-4D2A-8B4E-FD709BFB6B75}"/>
               </a:ext>
             </a:extLst>
           </p:cNvPr>
@@ -5199,111 +5456,15 @@
           <a:p>
             <a:r>
               <a:rPr lang="en-US" dirty="0"/>
-              <a:t>Represents 8x8 block of pixels as</a:t>
-            </a:r>
-          </a:p>
-          <a:p>
-            <a:pPr marL="0" indent="0">
-              <a:buNone/>
-            </a:pPr>
-            <a:r>
-              <a:rPr lang="en-US" dirty="0"/>
-              <a:t>   weights of this chart</a:t>
-            </a:r>
-          </a:p>
-          <a:p>
-            <a:r>
-              <a:rPr lang="en-US" dirty="0"/>
-              <a:t>For example, a black “A” on white</a:t>
-            </a:r>
-          </a:p>
-          <a:p>
-            <a:pPr marL="0" indent="0">
-              <a:buNone/>
-            </a:pPr>
-            <a:r>
-              <a:rPr lang="en-US" dirty="0"/>
-              <a:t>   background</a:t>
-            </a:r>
-          </a:p>
-        </p:txBody>
-      </p:sp>
-      <p:pic>
-        <p:nvPicPr>
-          <p:cNvPr id="9" name="Picture 8" descr="A screen shot of a window&#10;&#10;Description automatically generated">
-            <a:extLst>
-              <a:ext uri="{FF2B5EF4-FFF2-40B4-BE49-F238E27FC236}">
-                <a16:creationId xmlns:a16="http://schemas.microsoft.com/office/drawing/2014/main" id="{5C0CA914-DFDD-40D0-B9ED-C5457201D0C7}"/>
-              </a:ext>
-            </a:extLst>
-          </p:cNvPr>
-          <p:cNvPicPr>
-            <a:picLocks noChangeAspect="1"/>
-          </p:cNvPicPr>
-          <p:nvPr/>
-        </p:nvPicPr>
-        <p:blipFill>
-          <a:blip r:embed="rId2">
-            <a:extLst>
-              <a:ext uri="{28A0092B-C50C-407E-A947-70E740481C1C}">
-                <a14:useLocalDpi xmlns:a14="http://schemas.microsoft.com/office/drawing/2010/main" val="0"/>
-              </a:ext>
-            </a:extLst>
-          </a:blip>
-          <a:stretch>
-            <a:fillRect/>
-          </a:stretch>
-        </p:blipFill>
-        <p:spPr>
-          <a:xfrm>
-            <a:off x="7109928" y="1775702"/>
-            <a:ext cx="4861120" cy="4861120"/>
-          </a:xfrm>
-          <a:prstGeom prst="rect">
-            <a:avLst/>
-          </a:prstGeom>
-        </p:spPr>
-      </p:pic>
-      <p:pic>
-        <p:nvPicPr>
-          <p:cNvPr id="13" name="Picture 12" descr="A close up of a logo&#10;&#10;Description automatically generated">
-            <a:extLst>
-              <a:ext uri="{FF2B5EF4-FFF2-40B4-BE49-F238E27FC236}">
-                <a16:creationId xmlns:a16="http://schemas.microsoft.com/office/drawing/2014/main" id="{17E61B60-7155-4D37-8377-BAC559FE8D61}"/>
-              </a:ext>
-            </a:extLst>
-          </p:cNvPr>
-          <p:cNvPicPr>
-            <a:picLocks noChangeAspect="1"/>
-          </p:cNvPicPr>
-          <p:nvPr/>
-        </p:nvPicPr>
-        <p:blipFill>
-          <a:blip r:embed="rId3">
-            <a:extLst>
-              <a:ext uri="{28A0092B-C50C-407E-A947-70E740481C1C}">
-                <a14:useLocalDpi xmlns:a14="http://schemas.microsoft.com/office/drawing/2010/main" val="0"/>
-              </a:ext>
-            </a:extLst>
-          </a:blip>
-          <a:stretch>
-            <a:fillRect/>
-          </a:stretch>
-        </p:blipFill>
-        <p:spPr>
-          <a:xfrm>
-            <a:off x="1234881" y="4859055"/>
-            <a:ext cx="4861119" cy="1633820"/>
-          </a:xfrm>
-          <a:prstGeom prst="rect">
-            <a:avLst/>
-          </a:prstGeom>
-        </p:spPr>
-      </p:pic>
+              <a:t>Each pixel has a color value stored for r, g, b</a:t>
+            </a:r>
+          </a:p>
+        </p:txBody>
+      </p:sp>
     </p:spTree>
     <p:extLst>
       <p:ext uri="{BB962C8B-B14F-4D97-AF65-F5344CB8AC3E}">
-        <p14:creationId xmlns:p14="http://schemas.microsoft.com/office/powerpoint/2010/main" val="3713360684"/>
+        <p14:creationId xmlns:p14="http://schemas.microsoft.com/office/powerpoint/2010/main" val="2939054782"/>
       </p:ext>
     </p:extLst>
   </p:cSld>

</xml_diff>